<commit_message>
Scenarios 5 now + added to statement.txt
</commit_message>
<xml_diff>
--- a/Scenarios.pptx
+++ b/Scenarios.pptx
@@ -6,10 +6,11 @@
   </p:sldMasterIdLst>
   <p:sldIdLst>
     <p:sldId id="256" r:id="rId2"/>
-    <p:sldId id="257" r:id="rId3"/>
-    <p:sldId id="259" r:id="rId4"/>
-    <p:sldId id="260" r:id="rId5"/>
-    <p:sldId id="263" r:id="rId6"/>
+    <p:sldId id="260" r:id="rId3"/>
+    <p:sldId id="257" r:id="rId4"/>
+    <p:sldId id="264" r:id="rId5"/>
+    <p:sldId id="259" r:id="rId6"/>
+    <p:sldId id="263" r:id="rId7"/>
   </p:sldIdLst>
   <p:sldSz cx="12192000" cy="6858000"/>
   <p:notesSz cx="6858000" cy="9144000"/>
@@ -108,6 +109,11 @@
       </a:defRPr>
     </a:lvl9pPr>
   </p:defaultTextStyle>
+  <p:extLst>
+    <p:ext uri="{EFAFB233-063F-42B5-8137-9DF3F51BA10A}">
+      <p15:sldGuideLst xmlns:p15="http://schemas.microsoft.com/office/powerpoint/2012/main"/>
+    </p:ext>
+  </p:extLst>
 </p:presentation>
 </file>
 
@@ -3051,6 +3057,158 @@
           <a:chExt cx="0" cy="0"/>
         </a:xfrm>
       </p:grpSpPr>
+      <p:sp>
+        <p:nvSpPr>
+          <p:cNvPr id="2" name="Title 1"/>
+          <p:cNvSpPr>
+            <a:spLocks noGrp="1"/>
+          </p:cNvSpPr>
+          <p:nvPr>
+            <p:ph type="title"/>
+          </p:nvPr>
+        </p:nvSpPr>
+        <p:spPr/>
+        <p:txBody>
+          <a:bodyPr/>
+          <a:lstStyle/>
+          <a:p>
+            <a:r>
+              <a:rPr lang="en-AU" dirty="0" smtClean="0"/>
+              <a:t>High Car Probability</a:t>
+            </a:r>
+            <a:endParaRPr lang="en-AU" dirty="0"/>
+          </a:p>
+        </p:txBody>
+      </p:sp>
+      <p:pic>
+        <p:nvPicPr>
+          <p:cNvPr id="4" name="Picture 3"/>
+          <p:cNvPicPr>
+            <a:picLocks noChangeAspect="1"/>
+          </p:cNvPicPr>
+          <p:nvPr/>
+        </p:nvPicPr>
+        <p:blipFill rotWithShape="1">
+          <a:blip r:embed="rId2"/>
+          <a:srcRect r="73461" b="5271"/>
+          <a:stretch/>
+        </p:blipFill>
+        <p:spPr>
+          <a:xfrm>
+            <a:off x="190927" y="1982243"/>
+            <a:ext cx="2341168" cy="4698336"/>
+          </a:xfrm>
+          <a:prstGeom prst="rect">
+            <a:avLst/>
+          </a:prstGeom>
+        </p:spPr>
+      </p:pic>
+      <p:pic>
+        <p:nvPicPr>
+          <p:cNvPr id="5" name="Picture 4"/>
+          <p:cNvPicPr>
+            <a:picLocks noChangeAspect="1"/>
+          </p:cNvPicPr>
+          <p:nvPr/>
+        </p:nvPicPr>
+        <p:blipFill rotWithShape="1">
+          <a:blip r:embed="rId3"/>
+          <a:srcRect l="29458" r="52186" b="4929"/>
+          <a:stretch/>
+        </p:blipFill>
+        <p:spPr>
+          <a:xfrm>
+            <a:off x="2715905" y="1982243"/>
+            <a:ext cx="1619319" cy="4715301"/>
+          </a:xfrm>
+          <a:prstGeom prst="rect">
+            <a:avLst/>
+          </a:prstGeom>
+        </p:spPr>
+      </p:pic>
+      <p:pic>
+        <p:nvPicPr>
+          <p:cNvPr id="6" name="Picture 5"/>
+          <p:cNvPicPr>
+            <a:picLocks noChangeAspect="1"/>
+          </p:cNvPicPr>
+          <p:nvPr/>
+        </p:nvPicPr>
+        <p:blipFill rotWithShape="1">
+          <a:blip r:embed="rId4"/>
+          <a:srcRect b="5333"/>
+          <a:stretch/>
+        </p:blipFill>
+        <p:spPr>
+          <a:xfrm>
+            <a:off x="4519034" y="2777426"/>
+            <a:ext cx="7333397" cy="3903153"/>
+          </a:xfrm>
+          <a:prstGeom prst="rect">
+            <a:avLst/>
+          </a:prstGeom>
+        </p:spPr>
+      </p:pic>
+      <p:sp>
+        <p:nvSpPr>
+          <p:cNvPr id="7" name="TextBox 6"/>
+          <p:cNvSpPr txBox="1"/>
+          <p:nvPr/>
+        </p:nvSpPr>
+        <p:spPr>
+          <a:xfrm>
+            <a:off x="5677469" y="696036"/>
+            <a:ext cx="6373504" cy="1477328"/>
+          </a:xfrm>
+          <a:prstGeom prst="rect">
+            <a:avLst/>
+          </a:prstGeom>
+          <a:noFill/>
+        </p:spPr>
+        <p:txBody>
+          <a:bodyPr wrap="square" rtlCol="0">
+            <a:spAutoFit/>
+          </a:bodyPr>
+          <a:lstStyle/>
+          <a:p>
+            <a:r>
+              <a:rPr lang="en-AU" dirty="0" smtClean="0"/>
+              <a:t>The car probability was set to high, 95% with the small car probability only being 20%. As there were a lot more normal car spaces than small car spaces it was expected that all the normal cars would be parked and therefore the customers would be satisfied. The results below support this.</a:t>
+            </a:r>
+            <a:endParaRPr lang="en-AU" dirty="0"/>
+          </a:p>
+        </p:txBody>
+      </p:sp>
+    </p:spTree>
+    <p:extLst>
+      <p:ext uri="{BB962C8B-B14F-4D97-AF65-F5344CB8AC3E}">
+        <p14:creationId xmlns:p14="http://schemas.microsoft.com/office/powerpoint/2010/main" val="2890762765"/>
+      </p:ext>
+    </p:extLst>
+  </p:cSld>
+  <p:clrMapOvr>
+    <a:masterClrMapping/>
+  </p:clrMapOvr>
+</p:sld>
+</file>
+
+<file path=ppt/slides/slide3.xml><?xml version="1.0" encoding="utf-8"?>
+<p:sld xmlns:a="http://schemas.openxmlformats.org/drawingml/2006/main" xmlns:r="http://schemas.openxmlformats.org/officeDocument/2006/relationships" xmlns:p="http://schemas.openxmlformats.org/presentationml/2006/main">
+  <p:cSld>
+    <p:spTree>
+      <p:nvGrpSpPr>
+        <p:cNvPr id="1" name=""/>
+        <p:cNvGrpSpPr/>
+        <p:nvPr/>
+      </p:nvGrpSpPr>
+      <p:grpSpPr>
+        <a:xfrm>
+          <a:off x="0" y="0"/>
+          <a:ext cx="0" cy="0"/>
+          <a:chOff x="0" y="0"/>
+          <a:chExt cx="0" cy="0"/>
+        </a:xfrm>
+      </p:grpSpPr>
       <p:pic>
         <p:nvPicPr>
           <p:cNvPr id="5" name="Picture 4"/>
@@ -3194,158 +3352,6 @@
 </p:sld>
 </file>
 
-<file path=ppt/slides/slide3.xml><?xml version="1.0" encoding="utf-8"?>
-<p:sld xmlns:a="http://schemas.openxmlformats.org/drawingml/2006/main" xmlns:r="http://schemas.openxmlformats.org/officeDocument/2006/relationships" xmlns:p="http://schemas.openxmlformats.org/presentationml/2006/main">
-  <p:cSld>
-    <p:spTree>
-      <p:nvGrpSpPr>
-        <p:cNvPr id="1" name=""/>
-        <p:cNvGrpSpPr/>
-        <p:nvPr/>
-      </p:nvGrpSpPr>
-      <p:grpSpPr>
-        <a:xfrm>
-          <a:off x="0" y="0"/>
-          <a:ext cx="0" cy="0"/>
-          <a:chOff x="0" y="0"/>
-          <a:chExt cx="0" cy="0"/>
-        </a:xfrm>
-      </p:grpSpPr>
-      <p:sp>
-        <p:nvSpPr>
-          <p:cNvPr id="2" name="Title 1"/>
-          <p:cNvSpPr>
-            <a:spLocks noGrp="1"/>
-          </p:cNvSpPr>
-          <p:nvPr>
-            <p:ph type="title"/>
-          </p:nvPr>
-        </p:nvSpPr>
-        <p:spPr/>
-        <p:txBody>
-          <a:bodyPr/>
-          <a:lstStyle/>
-          <a:p>
-            <a:r>
-              <a:rPr lang="en-AU" dirty="0" smtClean="0"/>
-              <a:t>No Queue</a:t>
-            </a:r>
-            <a:endParaRPr lang="en-AU" dirty="0"/>
-          </a:p>
-        </p:txBody>
-      </p:sp>
-      <p:pic>
-        <p:nvPicPr>
-          <p:cNvPr id="4" name="Picture 3"/>
-          <p:cNvPicPr>
-            <a:picLocks noChangeAspect="1"/>
-          </p:cNvPicPr>
-          <p:nvPr/>
-        </p:nvPicPr>
-        <p:blipFill rotWithShape="1">
-          <a:blip r:embed="rId2"/>
-          <a:srcRect r="73356" b="5644"/>
-          <a:stretch/>
-        </p:blipFill>
-        <p:spPr>
-          <a:xfrm>
-            <a:off x="259307" y="1886947"/>
-            <a:ext cx="2383587" cy="4745864"/>
-          </a:xfrm>
-          <a:prstGeom prst="rect">
-            <a:avLst/>
-          </a:prstGeom>
-        </p:spPr>
-      </p:pic>
-      <p:pic>
-        <p:nvPicPr>
-          <p:cNvPr id="5" name="Picture 4"/>
-          <p:cNvPicPr>
-            <a:picLocks noChangeAspect="1"/>
-          </p:cNvPicPr>
-          <p:nvPr/>
-        </p:nvPicPr>
-        <p:blipFill rotWithShape="1">
-          <a:blip r:embed="rId3"/>
-          <a:srcRect l="29144" r="51661" b="5301"/>
-          <a:stretch/>
-        </p:blipFill>
-        <p:spPr>
-          <a:xfrm>
-            <a:off x="2802319" y="1869743"/>
-            <a:ext cx="1717238" cy="4763067"/>
-          </a:xfrm>
-          <a:prstGeom prst="rect">
-            <a:avLst/>
-          </a:prstGeom>
-        </p:spPr>
-      </p:pic>
-      <p:pic>
-        <p:nvPicPr>
-          <p:cNvPr id="6" name="Picture 5"/>
-          <p:cNvPicPr>
-            <a:picLocks noChangeAspect="1"/>
-          </p:cNvPicPr>
-          <p:nvPr/>
-        </p:nvPicPr>
-        <p:blipFill rotWithShape="1">
-          <a:blip r:embed="rId4"/>
-          <a:srcRect b="5333"/>
-          <a:stretch/>
-        </p:blipFill>
-        <p:spPr>
-          <a:xfrm>
-            <a:off x="4678982" y="2674960"/>
-            <a:ext cx="7436162" cy="3957850"/>
-          </a:xfrm>
-          <a:prstGeom prst="rect">
-            <a:avLst/>
-          </a:prstGeom>
-        </p:spPr>
-      </p:pic>
-      <p:sp>
-        <p:nvSpPr>
-          <p:cNvPr id="7" name="TextBox 6"/>
-          <p:cNvSpPr txBox="1"/>
-          <p:nvPr/>
-        </p:nvSpPr>
-        <p:spPr>
-          <a:xfrm>
-            <a:off x="5377218" y="573206"/>
-            <a:ext cx="6373504" cy="1754326"/>
-          </a:xfrm>
-          <a:prstGeom prst="rect">
-            <a:avLst/>
-          </a:prstGeom>
-          <a:noFill/>
-        </p:spPr>
-        <p:txBody>
-          <a:bodyPr wrap="square" rtlCol="0">
-            <a:spAutoFit/>
-          </a:bodyPr>
-          <a:lstStyle/>
-          <a:p>
-            <a:r>
-              <a:rPr lang="en-AU" dirty="0" smtClean="0"/>
-              <a:t>Although there was no queue the number of small car spaces created was fairly low as was the probability of small cars being generated. The probability of motorcycles was even lower, therefore it is unlikely that customers would be turned away due to lack of appropriate spaces. Thus the customer review in which all customers were satisfied was expected.</a:t>
-            </a:r>
-            <a:endParaRPr lang="en-AU" dirty="0"/>
-          </a:p>
-        </p:txBody>
-      </p:sp>
-    </p:spTree>
-    <p:extLst>
-      <p:ext uri="{BB962C8B-B14F-4D97-AF65-F5344CB8AC3E}">
-        <p14:creationId xmlns:p14="http://schemas.microsoft.com/office/powerpoint/2010/main" val="4150815593"/>
-      </p:ext>
-    </p:extLst>
-  </p:cSld>
-  <p:clrMapOvr>
-    <a:masterClrMapping/>
-  </p:clrMapOvr>
-</p:sld>
-</file>
-
 <file path=ppt/slides/slide4.xml><?xml version="1.0" encoding="utf-8"?>
 <p:sld xmlns:a="http://schemas.openxmlformats.org/drawingml/2006/main" xmlns:r="http://schemas.openxmlformats.org/officeDocument/2006/relationships" xmlns:p="http://schemas.openxmlformats.org/presentationml/2006/main">
   <p:cSld>
@@ -3380,7 +3386,7 @@
           <a:p>
             <a:r>
               <a:rPr lang="en-AU" dirty="0" smtClean="0"/>
-              <a:t>High Car Probability</a:t>
+              <a:t>High Small Car Probability</a:t>
             </a:r>
             <a:endParaRPr lang="en-AU" dirty="0"/>
           </a:p>
@@ -3396,13 +3402,13 @@
         </p:nvPicPr>
         <p:blipFill rotWithShape="1">
           <a:blip r:embed="rId2"/>
-          <a:srcRect r="73461" b="5271"/>
+          <a:srcRect r="74482" b="5326"/>
           <a:stretch/>
         </p:blipFill>
         <p:spPr>
           <a:xfrm>
-            <a:off x="190927" y="1982243"/>
-            <a:ext cx="2341168" cy="4698336"/>
+            <a:off x="167426" y="1690688"/>
+            <a:ext cx="2421225" cy="5050440"/>
           </a:xfrm>
           <a:prstGeom prst="rect">
             <a:avLst/>
@@ -3419,13 +3425,165 @@
         </p:nvPicPr>
         <p:blipFill rotWithShape="1">
           <a:blip r:embed="rId3"/>
-          <a:srcRect l="29458" r="52186" b="4929"/>
+          <a:srcRect l="28801" r="53481" b="5120"/>
           <a:stretch/>
         </p:blipFill>
         <p:spPr>
           <a:xfrm>
-            <a:off x="2715905" y="1982243"/>
-            <a:ext cx="1619319" cy="4715301"/>
+            <a:off x="2730323" y="1679731"/>
+            <a:ext cx="1681132" cy="5061397"/>
+          </a:xfrm>
+          <a:prstGeom prst="rect">
+            <a:avLst/>
+          </a:prstGeom>
+        </p:spPr>
+      </p:pic>
+      <p:pic>
+        <p:nvPicPr>
+          <p:cNvPr id="6" name="Picture 5"/>
+          <p:cNvPicPr>
+            <a:picLocks noChangeAspect="1"/>
+          </p:cNvPicPr>
+          <p:nvPr/>
+        </p:nvPicPr>
+        <p:blipFill rotWithShape="1">
+          <a:blip r:embed="rId4"/>
+          <a:srcRect t="191" b="5838"/>
+          <a:stretch/>
+        </p:blipFill>
+        <p:spPr>
+          <a:xfrm>
+            <a:off x="4681915" y="2949262"/>
+            <a:ext cx="7177115" cy="3791866"/>
+          </a:xfrm>
+          <a:prstGeom prst="rect">
+            <a:avLst/>
+          </a:prstGeom>
+        </p:spPr>
+      </p:pic>
+      <p:sp>
+        <p:nvSpPr>
+          <p:cNvPr id="7" name="TextBox 6"/>
+          <p:cNvSpPr txBox="1"/>
+          <p:nvPr/>
+        </p:nvSpPr>
+        <p:spPr>
+          <a:xfrm>
+            <a:off x="5264716" y="1679731"/>
+            <a:ext cx="6373504" cy="923330"/>
+          </a:xfrm>
+          <a:prstGeom prst="rect">
+            <a:avLst/>
+          </a:prstGeom>
+          <a:noFill/>
+        </p:spPr>
+        <p:txBody>
+          <a:bodyPr wrap="square" rtlCol="0">
+            <a:spAutoFit/>
+          </a:bodyPr>
+          <a:lstStyle/>
+          <a:p>
+            <a:r>
+              <a:rPr lang="en-AU" dirty="0" smtClean="0"/>
+              <a:t>The probability of small cars was set to high as was the probability of all cars. As small cars can park in normal car spaces it was expected that most if not all customers would be satisfied.</a:t>
+            </a:r>
+            <a:endParaRPr lang="en-AU" dirty="0"/>
+          </a:p>
+        </p:txBody>
+      </p:sp>
+    </p:spTree>
+    <p:extLst>
+      <p:ext uri="{BB962C8B-B14F-4D97-AF65-F5344CB8AC3E}">
+        <p14:creationId xmlns:p14="http://schemas.microsoft.com/office/powerpoint/2010/main" val="3836147266"/>
+      </p:ext>
+    </p:extLst>
+  </p:cSld>
+  <p:clrMapOvr>
+    <a:masterClrMapping/>
+  </p:clrMapOvr>
+</p:sld>
+</file>
+
+<file path=ppt/slides/slide5.xml><?xml version="1.0" encoding="utf-8"?>
+<p:sld xmlns:a="http://schemas.openxmlformats.org/drawingml/2006/main" xmlns:r="http://schemas.openxmlformats.org/officeDocument/2006/relationships" xmlns:p="http://schemas.openxmlformats.org/presentationml/2006/main">
+  <p:cSld>
+    <p:spTree>
+      <p:nvGrpSpPr>
+        <p:cNvPr id="1" name=""/>
+        <p:cNvGrpSpPr/>
+        <p:nvPr/>
+      </p:nvGrpSpPr>
+      <p:grpSpPr>
+        <a:xfrm>
+          <a:off x="0" y="0"/>
+          <a:ext cx="0" cy="0"/>
+          <a:chOff x="0" y="0"/>
+          <a:chExt cx="0" cy="0"/>
+        </a:xfrm>
+      </p:grpSpPr>
+      <p:sp>
+        <p:nvSpPr>
+          <p:cNvPr id="2" name="Title 1"/>
+          <p:cNvSpPr>
+            <a:spLocks noGrp="1"/>
+          </p:cNvSpPr>
+          <p:nvPr>
+            <p:ph type="title"/>
+          </p:nvPr>
+        </p:nvSpPr>
+        <p:spPr/>
+        <p:txBody>
+          <a:bodyPr/>
+          <a:lstStyle/>
+          <a:p>
+            <a:r>
+              <a:rPr lang="en-AU" dirty="0" smtClean="0"/>
+              <a:t>No Queue</a:t>
+            </a:r>
+            <a:endParaRPr lang="en-AU" dirty="0"/>
+          </a:p>
+        </p:txBody>
+      </p:sp>
+      <p:pic>
+        <p:nvPicPr>
+          <p:cNvPr id="4" name="Picture 3"/>
+          <p:cNvPicPr>
+            <a:picLocks noChangeAspect="1"/>
+          </p:cNvPicPr>
+          <p:nvPr/>
+        </p:nvPicPr>
+        <p:blipFill rotWithShape="1">
+          <a:blip r:embed="rId2"/>
+          <a:srcRect r="73356" b="5644"/>
+          <a:stretch/>
+        </p:blipFill>
+        <p:spPr>
+          <a:xfrm>
+            <a:off x="259307" y="1886947"/>
+            <a:ext cx="2383587" cy="4745864"/>
+          </a:xfrm>
+          <a:prstGeom prst="rect">
+            <a:avLst/>
+          </a:prstGeom>
+        </p:spPr>
+      </p:pic>
+      <p:pic>
+        <p:nvPicPr>
+          <p:cNvPr id="5" name="Picture 4"/>
+          <p:cNvPicPr>
+            <a:picLocks noChangeAspect="1"/>
+          </p:cNvPicPr>
+          <p:nvPr/>
+        </p:nvPicPr>
+        <p:blipFill rotWithShape="1">
+          <a:blip r:embed="rId3"/>
+          <a:srcRect l="29144" r="51661" b="5301"/>
+          <a:stretch/>
+        </p:blipFill>
+        <p:spPr>
+          <a:xfrm>
+            <a:off x="2802319" y="1869743"/>
+            <a:ext cx="1717238" cy="4763067"/>
           </a:xfrm>
           <a:prstGeom prst="rect">
             <a:avLst/>
@@ -3447,8 +3605,8 @@
         </p:blipFill>
         <p:spPr>
           <a:xfrm>
-            <a:off x="4519034" y="2777426"/>
-            <a:ext cx="7333397" cy="3903153"/>
+            <a:off x="4678982" y="2674960"/>
+            <a:ext cx="7436162" cy="3957850"/>
           </a:xfrm>
           <a:prstGeom prst="rect">
             <a:avLst/>
@@ -3463,8 +3621,8 @@
         </p:nvSpPr>
         <p:spPr>
           <a:xfrm>
-            <a:off x="5677469" y="696036"/>
-            <a:ext cx="6373504" cy="1477328"/>
+            <a:off x="5377218" y="573206"/>
+            <a:ext cx="6373504" cy="1754326"/>
           </a:xfrm>
           <a:prstGeom prst="rect">
             <a:avLst/>
@@ -3479,7 +3637,7 @@
           <a:p>
             <a:r>
               <a:rPr lang="en-AU" dirty="0" smtClean="0"/>
-              <a:t>The car probability was set to high, 95% with the small car probability only being 20%. As there were a lot more normal car spaces than small car spaces it was expected that all the normal cars would be parked and therefore the customers would be satisfied. The results below support this.</a:t>
+              <a:t>Although there was no queue the number of small car spaces created was fairly low as was the probability of small cars being generated. The probability of motorcycles was even lower, therefore it is unlikely that customers would be turned away due to lack of appropriate spaces. Thus the customer review in which all customers were satisfied was expected.</a:t>
             </a:r>
             <a:endParaRPr lang="en-AU" dirty="0"/>
           </a:p>
@@ -3488,7 +3646,7 @@
     </p:spTree>
     <p:extLst>
       <p:ext uri="{BB962C8B-B14F-4D97-AF65-F5344CB8AC3E}">
-        <p14:creationId xmlns:p14="http://schemas.microsoft.com/office/powerpoint/2010/main" val="2890762765"/>
+        <p14:creationId xmlns:p14="http://schemas.microsoft.com/office/powerpoint/2010/main" val="4150815593"/>
       </p:ext>
     </p:extLst>
   </p:cSld>
@@ -3498,7 +3656,7 @@
 </p:sld>
 </file>
 
-<file path=ppt/slides/slide5.xml><?xml version="1.0" encoding="utf-8"?>
+<file path=ppt/slides/slide6.xml><?xml version="1.0" encoding="utf-8"?>
 <p:sld xmlns:a="http://schemas.openxmlformats.org/drawingml/2006/main" xmlns:r="http://schemas.openxmlformats.org/officeDocument/2006/relationships" xmlns:p="http://schemas.openxmlformats.org/presentationml/2006/main">
   <p:cSld>
     <p:spTree>

</xml_diff>